<commit_message>
Update Bayesian and ensemble model slides and handouts
Added annotated version of Bayesian models slides. Updated original PowerPoint and PDF handouts for Bayesian models and ensemble/kernel models with new corrections.
</commit_message>
<xml_diff>
--- a/slides/04- Bayesian models/ML4NuerScience_BayesianModels.pptx
+++ b/slides/04- Bayesian models/ML4NuerScience_BayesianModels.pptx
@@ -362,7 +362,7 @@
               <a:pPr>
                 <a:defRPr/>
               </a:pPr>
-              <a:t>29/12/2025</a:t>
+              <a:t>14/01/2026</a:t>
             </a:fld>
             <a:endParaRPr lang="en-GB" altLang="en-US" dirty="0"/>
           </a:p>
@@ -596,7 +596,7 @@
               <a:pPr>
                 <a:defRPr/>
               </a:pPr>
-              <a:t>29/12/2025</a:t>
+              <a:t>14/01/2026</a:t>
             </a:fld>
             <a:endParaRPr lang="en-GB" altLang="en-US" dirty="0"/>
           </a:p>
@@ -1255,8 +1255,8 @@
         </p:nvSpPr>
         <p:spPr/>
       </p:sp>
-      <mc:AlternateContent xmlns:mc="http://schemas.openxmlformats.org/markup-compatibility/2006">
-        <mc:Choice xmlns:a14="http://schemas.microsoft.com/office/drawing/2010/main" Requires="a14">
+      <mc:AlternateContent xmlns:mc="http://schemas.openxmlformats.org/markup-compatibility/2006" xmlns:a14="http://schemas.microsoft.com/office/drawing/2010/main">
+        <mc:Choice Requires="a14">
           <p:sp>
             <p:nvSpPr>
               <p:cNvPr id="3" name="Notes Placeholder 2"/>
@@ -1332,7 +1332,7 @@
                         <a:solidFill>
                           <a:schemeClr val="tx1"/>
                         </a:solidFill>
-                        <a:latin typeface="+mn-lt"/>
+                        <a:latin typeface="Cambria Math" panose="02040503050406030204" pitchFamily="18" charset="0"/>
                         <a:ea typeface="ＭＳ Ｐゴシック" charset="0"/>
                         <a:cs typeface="+mn-cs"/>
                       </a:rPr>
@@ -1359,7 +1359,7 @@
                         <a:solidFill>
                           <a:schemeClr val="tx1"/>
                         </a:solidFill>
-                        <a:latin typeface="+mn-lt"/>
+                        <a:latin typeface="Cambria Math" panose="02040503050406030204" pitchFamily="18" charset="0"/>
                         <a:ea typeface="ＭＳ Ｐゴシック" charset="0"/>
                         <a:cs typeface="+mn-cs"/>
                       </a:rPr>
@@ -1386,7 +1386,7 @@
                         <a:solidFill>
                           <a:schemeClr val="tx1"/>
                         </a:solidFill>
-                        <a:latin typeface="+mn-lt"/>
+                        <a:latin typeface="Cambria Math" panose="02040503050406030204" pitchFamily="18" charset="0"/>
                         <a:ea typeface="ＭＳ Ｐゴシック" charset="0"/>
                         <a:cs typeface="+mn-cs"/>
                       </a:rPr>
@@ -1399,7 +1399,7 @@
                             <a:solidFill>
                               <a:schemeClr val="tx1"/>
                             </a:solidFill>
-                            <a:latin typeface="+mn-lt"/>
+                            <a:latin typeface="Cambria Math" panose="02040503050406030204" pitchFamily="18" charset="0"/>
                             <a:ea typeface="ＭＳ Ｐゴシック" charset="0"/>
                             <a:cs typeface="+mn-cs"/>
                           </a:rPr>
@@ -1411,7 +1411,7 @@
                             <a:solidFill>
                               <a:schemeClr val="tx1"/>
                             </a:solidFill>
-                            <a:latin typeface="+mn-lt"/>
+                            <a:latin typeface="Cambria Math" panose="02040503050406030204" pitchFamily="18" charset="0"/>
                             <a:ea typeface="ＭＳ Ｐゴシック" charset="0"/>
                             <a:cs typeface="+mn-cs"/>
                           </a:rPr>
@@ -1452,7 +1452,7 @@
                         <a:solidFill>
                           <a:schemeClr val="tx1"/>
                         </a:solidFill>
-                        <a:latin typeface="+mn-lt"/>
+                        <a:latin typeface="Cambria Math" panose="02040503050406030204" pitchFamily="18" charset="0"/>
                         <a:ea typeface="ＭＳ Ｐゴシック" charset="0"/>
                         <a:cs typeface="+mn-cs"/>
                       </a:rPr>
@@ -1480,11 +1480,11 @@
                         <m:limLoc m:val="subSup"/>
                         <m:grow m:val="on"/>
                         <m:ctrlPr>
-                          <a:rPr lang="ar-AE" sz="1538" kern="1200">
+                          <a:rPr lang="ar-AE" sz="1538" i="1" kern="1200">
                             <a:solidFill>
                               <a:schemeClr val="tx1"/>
                             </a:solidFill>
-                            <a:latin typeface="+mn-lt"/>
+                            <a:latin typeface="Cambria Math" panose="02040503050406030204" pitchFamily="18" charset="0"/>
                             <a:ea typeface="ＭＳ Ｐゴシック" charset="0"/>
                             <a:cs typeface="+mn-cs"/>
                           </a:rPr>
@@ -1496,7 +1496,7 @@
                             <a:solidFill>
                               <a:schemeClr val="tx1"/>
                             </a:solidFill>
-                            <a:latin typeface="+mn-lt"/>
+                            <a:latin typeface="Cambria Math" panose="02040503050406030204" pitchFamily="18" charset="0"/>
                             <a:ea typeface="ＭＳ Ｐゴシック" charset="0"/>
                             <a:cs typeface="+mn-cs"/>
                           </a:rPr>
@@ -1507,7 +1507,7 @@
                             <a:solidFill>
                               <a:schemeClr val="tx1"/>
                             </a:solidFill>
-                            <a:latin typeface="+mn-lt"/>
+                            <a:latin typeface="Cambria Math" panose="02040503050406030204" pitchFamily="18" charset="0"/>
                             <a:ea typeface="ＭＳ Ｐゴシック" charset="0"/>
                             <a:cs typeface="+mn-cs"/>
                           </a:rPr>
@@ -1520,7 +1520,7 @@
                             <a:solidFill>
                               <a:schemeClr val="tx1"/>
                             </a:solidFill>
-                            <a:latin typeface="+mn-lt"/>
+                            <a:latin typeface="Cambria Math" panose="02040503050406030204" pitchFamily="18" charset="0"/>
                             <a:ea typeface="ＭＳ Ｐゴシック" charset="0"/>
                             <a:cs typeface="+mn-cs"/>
                           </a:rPr>
@@ -1533,7 +1533,7 @@
                             <a:solidFill>
                               <a:schemeClr val="tx1"/>
                             </a:solidFill>
-                            <a:latin typeface="+mn-lt"/>
+                            <a:latin typeface="Cambria Math" panose="02040503050406030204" pitchFamily="18" charset="0"/>
                             <a:ea typeface="ＭＳ Ｐゴシック" charset="0"/>
                             <a:cs typeface="+mn-cs"/>
                           </a:rPr>
@@ -1548,7 +1548,7 @@
                             <a:solidFill>
                               <a:schemeClr val="tx1"/>
                             </a:solidFill>
-                            <a:latin typeface="+mn-lt"/>
+                            <a:latin typeface="Cambria Math" panose="02040503050406030204" pitchFamily="18" charset="0"/>
                             <a:ea typeface="ＭＳ Ｐゴシック" charset="0"/>
                             <a:cs typeface="+mn-cs"/>
                           </a:rPr>
@@ -1562,7 +1562,7 @@
                                 <a:solidFill>
                                   <a:schemeClr val="tx1"/>
                                 </a:solidFill>
-                                <a:latin typeface="+mn-lt"/>
+                                <a:latin typeface="Cambria Math" panose="02040503050406030204" pitchFamily="18" charset="0"/>
                                 <a:ea typeface="ＭＳ Ｐゴシック" charset="0"/>
                                 <a:cs typeface="+mn-cs"/>
                               </a:rPr>
@@ -1574,7 +1574,7 @@
                                 <a:solidFill>
                                   <a:schemeClr val="tx1"/>
                                 </a:solidFill>
-                                <a:latin typeface="+mn-lt"/>
+                                <a:latin typeface="Cambria Math" panose="02040503050406030204" pitchFamily="18" charset="0"/>
                                 <a:ea typeface="ＭＳ Ｐゴシック" charset="0"/>
                                 <a:cs typeface="+mn-cs"/>
                               </a:rPr>
@@ -1587,7 +1587,7 @@
                                 <a:solidFill>
                                   <a:schemeClr val="tx1"/>
                                 </a:solidFill>
-                                <a:latin typeface="+mn-lt"/>
+                                <a:latin typeface="Cambria Math" panose="02040503050406030204" pitchFamily="18" charset="0"/>
                                 <a:ea typeface="ＭＳ Ｐゴシック" charset="0"/>
                                 <a:cs typeface="+mn-cs"/>
                               </a:rPr>
@@ -1600,7 +1600,7 @@
                             <a:solidFill>
                               <a:schemeClr val="tx1"/>
                             </a:solidFill>
-                            <a:latin typeface="+mn-lt"/>
+                            <a:latin typeface="Cambria Math" panose="02040503050406030204" pitchFamily="18" charset="0"/>
                             <a:ea typeface="ＭＳ Ｐゴシック" charset="0"/>
                             <a:cs typeface="+mn-cs"/>
                           </a:rPr>
@@ -1611,7 +1611,7 @@
                             <a:solidFill>
                               <a:schemeClr val="tx1"/>
                             </a:solidFill>
-                            <a:latin typeface="+mn-lt"/>
+                            <a:latin typeface="Cambria Math" panose="02040503050406030204" pitchFamily="18" charset="0"/>
                             <a:ea typeface="ＭＳ Ｐゴシック" charset="0"/>
                             <a:cs typeface="+mn-cs"/>
                           </a:rPr>
@@ -1677,7 +1677,7 @@
             </p:txBody>
           </p:sp>
         </mc:Choice>
-        <mc:Fallback>
+        <mc:Fallback xmlns="">
           <p:sp>
             <p:nvSpPr>
               <p:cNvPr id="3" name="Notes Placeholder 2"/>
@@ -1995,8 +1995,8 @@
         </p:nvSpPr>
         <p:spPr/>
       </p:sp>
-      <mc:AlternateContent xmlns:mc="http://schemas.openxmlformats.org/markup-compatibility/2006">
-        <mc:Choice xmlns:a14="http://schemas.microsoft.com/office/drawing/2010/main" Requires="a14">
+      <mc:AlternateContent xmlns:mc="http://schemas.openxmlformats.org/markup-compatibility/2006" xmlns:a14="http://schemas.microsoft.com/office/drawing/2010/main">
+        <mc:Choice Requires="a14">
           <p:sp>
             <p:nvSpPr>
               <p:cNvPr id="3" name="Notes Placeholder 2"/>
@@ -2048,7 +2048,7 @@
                         <a:solidFill>
                           <a:schemeClr val="tx1"/>
                         </a:solidFill>
-                        <a:latin typeface="+mn-lt"/>
+                        <a:latin typeface="Cambria Math" panose="02040503050406030204" pitchFamily="18" charset="0"/>
                         <a:ea typeface="ＭＳ Ｐゴシック" charset="0"/>
                         <a:cs typeface="+mn-cs"/>
                       </a:rPr>
@@ -2075,7 +2075,7 @@
             </p:txBody>
           </p:sp>
         </mc:Choice>
-        <mc:Fallback>
+        <mc:Fallback xmlns="">
           <p:sp>
             <p:nvSpPr>
               <p:cNvPr id="3" name="Notes Placeholder 2"/>
@@ -2503,7 +2503,7 @@
               <a:pPr>
                 <a:defRPr/>
               </a:pPr>
-              <a:t>29/12/2025</a:t>
+              <a:t>14/01/2026</a:t>
             </a:fld>
             <a:endParaRPr lang="en-GB" altLang="en-US" dirty="0"/>
           </a:p>
@@ -2766,7 +2766,7 @@
               <a:pPr>
                 <a:defRPr/>
               </a:pPr>
-              <a:t>29/12/2025</a:t>
+              <a:t>14/01/2026</a:t>
             </a:fld>
             <a:endParaRPr lang="en-GB" altLang="en-US" dirty="0"/>
           </a:p>
@@ -3004,7 +3004,7 @@
               <a:pPr>
                 <a:defRPr/>
               </a:pPr>
-              <a:t>29/12/2025</a:t>
+              <a:t>14/01/2026</a:t>
             </a:fld>
             <a:endParaRPr lang="en-GB" altLang="en-US" dirty="0"/>
           </a:p>
@@ -3338,7 +3338,7 @@
               <a:pPr>
                 <a:defRPr/>
               </a:pPr>
-              <a:t>29/12/2025</a:t>
+              <a:t>14/01/2026</a:t>
             </a:fld>
             <a:endParaRPr lang="en-GB" altLang="en-US" dirty="0"/>
           </a:p>
@@ -3811,7 +3811,7 @@
               <a:pPr>
                 <a:defRPr/>
               </a:pPr>
-              <a:t>29/12/2025</a:t>
+              <a:t>14/01/2026</a:t>
             </a:fld>
             <a:endParaRPr lang="en-GB" altLang="en-US" dirty="0"/>
           </a:p>
@@ -3975,7 +3975,7 @@
               <a:pPr>
                 <a:defRPr/>
               </a:pPr>
-              <a:t>29/12/2025</a:t>
+              <a:t>14/01/2026</a:t>
             </a:fld>
             <a:endParaRPr lang="en-GB" altLang="en-US" dirty="0"/>
           </a:p>
@@ -4116,7 +4116,7 @@
               <a:pPr>
                 <a:defRPr/>
               </a:pPr>
-              <a:t>29/12/2025</a:t>
+              <a:t>14/01/2026</a:t>
             </a:fld>
             <a:endParaRPr lang="en-GB" altLang="en-US" dirty="0"/>
           </a:p>
@@ -4416,7 +4416,7 @@
               <a:pPr>
                 <a:defRPr/>
               </a:pPr>
-              <a:t>29/12/2025</a:t>
+              <a:t>14/01/2026</a:t>
             </a:fld>
             <a:endParaRPr lang="en-GB" altLang="en-US" dirty="0"/>
           </a:p>
@@ -4742,7 +4742,7 @@
               <a:pPr>
                 <a:defRPr/>
               </a:pPr>
-              <a:t>29/12/2025</a:t>
+              <a:t>14/01/2026</a:t>
             </a:fld>
             <a:endParaRPr lang="en-GB" altLang="en-US" dirty="0"/>
           </a:p>
@@ -7697,8 +7697,8 @@
           </a:p>
         </p:txBody>
       </p:sp>
-      <mc:AlternateContent xmlns:mc="http://schemas.openxmlformats.org/markup-compatibility/2006">
-        <mc:Choice xmlns:a14="http://schemas.microsoft.com/office/drawing/2010/main" Requires="a14">
+      <mc:AlternateContent xmlns:mc="http://schemas.openxmlformats.org/markup-compatibility/2006" xmlns:a14="http://schemas.microsoft.com/office/drawing/2010/main">
+        <mc:Choice Requires="a14">
           <p:sp>
             <p:nvSpPr>
               <p:cNvPr id="8" name="TextBox 7">
@@ -8352,7 +8352,7 @@
             </p:txBody>
           </p:sp>
         </mc:Choice>
-        <mc:Fallback>
+        <mc:Fallback xmlns="">
           <p:sp>
             <p:nvSpPr>
               <p:cNvPr id="8" name="TextBox 7">
@@ -8455,8 +8455,8 @@
           </a:p>
         </p:txBody>
       </p:sp>
-      <mc:AlternateContent xmlns:mc="http://schemas.openxmlformats.org/markup-compatibility/2006">
-        <mc:Choice xmlns:a14="http://schemas.microsoft.com/office/drawing/2010/main" Requires="a14">
+      <mc:AlternateContent xmlns:mc="http://schemas.openxmlformats.org/markup-compatibility/2006" xmlns:a14="http://schemas.microsoft.com/office/drawing/2010/main">
+        <mc:Choice Requires="a14">
           <p:sp>
             <p:nvSpPr>
               <p:cNvPr id="3" name="Content Placeholder 2">
@@ -8909,7 +8909,9 @@
                 <a14:m>
                   <m:oMath xmlns:m="http://schemas.openxmlformats.org/officeDocument/2006/math">
                     <m:r>
-                      <a:rPr lang="en-GB" kern="1200"/>
+                      <a:rPr lang="en-GB" kern="1200">
+                        <a:latin typeface="Cambria Math" panose="02040503050406030204" pitchFamily="18" charset="0"/>
+                      </a:rPr>
                       <m:t>𝑦</m:t>
                     </m:r>
                   </m:oMath>
@@ -8932,7 +8934,7 @@
             </p:txBody>
           </p:sp>
         </mc:Choice>
-        <mc:Fallback>
+        <mc:Fallback xmlns="">
           <p:sp>
             <p:nvSpPr>
               <p:cNvPr id="3" name="Content Placeholder 2">
@@ -14469,8 +14471,8 @@
           </a:p>
         </p:txBody>
       </p:sp>
-      <mc:AlternateContent xmlns:mc="http://schemas.openxmlformats.org/markup-compatibility/2006">
-        <mc:Choice xmlns:a14="http://schemas.microsoft.com/office/drawing/2010/main" Requires="a14">
+      <mc:AlternateContent xmlns:mc="http://schemas.openxmlformats.org/markup-compatibility/2006" xmlns:a14="http://schemas.microsoft.com/office/drawing/2010/main">
+        <mc:Choice Requires="a14">
           <p:sp>
             <p:nvSpPr>
               <p:cNvPr id="3" name="Content Placeholder 2">
@@ -14573,7 +14575,7 @@
             </p:txBody>
           </p:sp>
         </mc:Choice>
-        <mc:Fallback>
+        <mc:Fallback xmlns="">
           <p:sp>
             <p:nvSpPr>
               <p:cNvPr id="3" name="Content Placeholder 2">
@@ -14862,8 +14864,8 @@
           </a:p>
         </p:txBody>
       </p:sp>
-      <mc:AlternateContent xmlns:mc="http://schemas.openxmlformats.org/markup-compatibility/2006">
-        <mc:Choice xmlns:a14="http://schemas.microsoft.com/office/drawing/2010/main" Requires="a14">
+      <mc:AlternateContent xmlns:mc="http://schemas.openxmlformats.org/markup-compatibility/2006" xmlns:a14="http://schemas.microsoft.com/office/drawing/2010/main">
+        <mc:Choice Requires="a14">
           <p:sp>
             <p:nvSpPr>
               <p:cNvPr id="3" name="Content Placeholder 2">
@@ -15140,7 +15142,7 @@
             </p:txBody>
           </p:sp>
         </mc:Choice>
-        <mc:Fallback>
+        <mc:Fallback xmlns="">
           <p:sp>
             <p:nvSpPr>
               <p:cNvPr id="3" name="Content Placeholder 2">
@@ -15268,8 +15270,8 @@
           </a:p>
         </p:txBody>
       </p:sp>
-      <mc:AlternateContent xmlns:mc="http://schemas.openxmlformats.org/markup-compatibility/2006">
-        <mc:Choice xmlns:a14="http://schemas.microsoft.com/office/drawing/2010/main" Requires="a14">
+      <mc:AlternateContent xmlns:mc="http://schemas.openxmlformats.org/markup-compatibility/2006" xmlns:a14="http://schemas.microsoft.com/office/drawing/2010/main">
+        <mc:Choice Requires="a14">
           <p:sp>
             <p:nvSpPr>
               <p:cNvPr id="3" name="Content Placeholder 2">
@@ -15591,7 +15593,7 @@
             </p:txBody>
           </p:sp>
         </mc:Choice>
-        <mc:Fallback>
+        <mc:Fallback xmlns="">
           <p:sp>
             <p:nvSpPr>
               <p:cNvPr id="3" name="Content Placeholder 2">
@@ -15719,8 +15721,8 @@
           </a:p>
         </p:txBody>
       </p:sp>
-      <mc:AlternateContent xmlns:mc="http://schemas.openxmlformats.org/markup-compatibility/2006">
-        <mc:Choice xmlns:a14="http://schemas.microsoft.com/office/drawing/2010/main" Requires="a14">
+      <mc:AlternateContent xmlns:mc="http://schemas.openxmlformats.org/markup-compatibility/2006" xmlns:a14="http://schemas.microsoft.com/office/drawing/2010/main">
+        <mc:Choice Requires="a14">
           <p:sp>
             <p:nvSpPr>
               <p:cNvPr id="3" name="Content Placeholder 2">
@@ -15990,7 +15992,7 @@
             </p:txBody>
           </p:sp>
         </mc:Choice>
-        <mc:Fallback>
+        <mc:Fallback xmlns="">
           <p:sp>
             <p:nvSpPr>
               <p:cNvPr id="3" name="Content Placeholder 2">
@@ -17222,8 +17224,8 @@
           </a:p>
         </p:txBody>
       </p:sp>
-      <mc:AlternateContent xmlns:mc="http://schemas.openxmlformats.org/markup-compatibility/2006">
-        <mc:Choice xmlns:a14="http://schemas.microsoft.com/office/drawing/2010/main" Requires="a14">
+      <mc:AlternateContent xmlns:mc="http://schemas.openxmlformats.org/markup-compatibility/2006" xmlns:a14="http://schemas.microsoft.com/office/drawing/2010/main">
+        <mc:Choice Requires="a14">
           <p:sp>
             <p:nvSpPr>
               <p:cNvPr id="3" name="Content Placeholder 2">
@@ -17355,7 +17357,7 @@
             </p:txBody>
           </p:sp>
         </mc:Choice>
-        <mc:Fallback>
+        <mc:Fallback xmlns="">
           <p:sp>
             <p:nvSpPr>
               <p:cNvPr id="3" name="Content Placeholder 2">
@@ -29332,16 +29334,9 @@
             </a:r>
           </a:p>
           <a:p>
-            <a:pPr lvl="1"/>
-            <a:r>
-              <a:rPr lang="en-GB" kern="1200" dirty="0">
-                <a:ea typeface="ＭＳ Ｐゴシック" charset="0"/>
-              </a:rPr>
-              <a:t>Accuracy for minority ethnic groups: 82%</a:t>
-            </a:r>
-          </a:p>
-          <a:p>
-            <a:pPr lvl="1"/>
+            <a:pPr marL="457182" lvl="1" indent="0">
+              <a:buNone/>
+            </a:pPr>
             <a:endParaRPr lang="en-GB" kern="1200" dirty="0">
               <a:ea typeface="ＭＳ Ｐゴシック" charset="0"/>
             </a:endParaRPr>
@@ -30776,8 +30771,8 @@
           </a:p>
         </p:txBody>
       </p:sp>
-      <mc:AlternateContent xmlns:mc="http://schemas.openxmlformats.org/markup-compatibility/2006">
-        <mc:Choice xmlns:a14="http://schemas.microsoft.com/office/drawing/2010/main" Requires="a14">
+      <mc:AlternateContent xmlns:mc="http://schemas.openxmlformats.org/markup-compatibility/2006" xmlns:a14="http://schemas.microsoft.com/office/drawing/2010/main">
+        <mc:Choice Requires="a14">
           <p:sp>
             <p:nvSpPr>
               <p:cNvPr id="3" name="Content Placeholder 2">
@@ -31185,7 +31180,7 @@
             </p:txBody>
           </p:sp>
         </mc:Choice>
-        <mc:Fallback>
+        <mc:Fallback xmlns="">
           <p:sp>
             <p:nvSpPr>
               <p:cNvPr id="3" name="Content Placeholder 2">

</xml_diff>